<commit_message>
finish mar 13 lesson
</commit_message>
<xml_diff>
--- a/DD1/F_Mar13/C_RandomForests.pptx
+++ b/DD1/F_Mar13/C_RandomForests.pptx
@@ -4568,7 +4568,7 @@
             </a:r>
             <a:r>
               <a:rPr lang="en-US" sz="2800" dirty="0" err="1"/>
-              <a:t>B_Bank</a:t>
+              <a:t>C_Bank</a:t>
             </a:r>
             <a:r>
               <a:rPr lang="en-US" sz="2800" dirty="0"/>
@@ -4813,7 +4813,7 @@
             </a:r>
             <a:r>
               <a:rPr lang="en-US" sz="2800" dirty="0" err="1"/>
-              <a:t>C_Bank</a:t>
+              <a:t>D_Bank</a:t>
             </a:r>
             <a:r>
               <a:rPr lang="en-US" sz="2800" dirty="0"/>

</xml_diff>